<commit_message>
Changed media control plane to SDK control place per feedback
</commit_message>
<xml_diff>
--- a/docs/deployment_guide/images/architecture-diagram-salesforce-health-cloud-virtual-care.pptx
+++ b/docs/deployment_guide/images/architecture-diagram-salesforce-health-cloud-virtual-care.pptx
@@ -3726,8 +3726,8 @@
         </p:nvSpPr>
         <p:spPr bwMode="auto">
           <a:xfrm>
-            <a:off x="6152395" y="3321390"/>
-            <a:ext cx="1527175" cy="461665"/>
+            <a:off x="6085459" y="3322080"/>
+            <a:ext cx="1665482" cy="461665"/>
           </a:xfrm>
           <a:prstGeom prst="rect">
             <a:avLst/>
@@ -3866,7 +3866,7 @@
                 <a:ea typeface="Amazon Ember" panose="020B0603020204020204" pitchFamily="34" charset="0"/>
                 <a:cs typeface="Arial" panose="020B0604020202020204" pitchFamily="34" charset="0"/>
               </a:rPr>
-              <a:t>Amazon Chime control plane</a:t>
+              <a:t>Amazon Chime SDK control plane</a:t>
             </a:r>
           </a:p>
         </p:txBody>

</xml_diff>

<commit_message>
Updated architecture image to correctly reflect Health Cloud's Self-Service Appointment Management
</commit_message>
<xml_diff>
--- a/docs/deployment_guide/images/architecture-diagram-salesforce-health-cloud-virtual-care.pptx
+++ b/docs/deployment_guide/images/architecture-diagram-salesforce-health-cloud-virtual-care.pptx
@@ -243,7 +243,7 @@
           <a:p>
             <a:fld id="{910FE9F8-85C6-4D94-8C60-6B46B301E45E}" type="datetimeFigureOut">
               <a:rPr lang="en-US" smtClean="0"/>
-              <a:t>9/28/2022</a:t>
+              <a:t>10/6/22</a:t>
             </a:fld>
             <a:endParaRPr lang="en-US"/>
           </a:p>
@@ -413,7 +413,7 @@
           <a:p>
             <a:fld id="{910FE9F8-85C6-4D94-8C60-6B46B301E45E}" type="datetimeFigureOut">
               <a:rPr lang="en-US" smtClean="0"/>
-              <a:t>9/28/2022</a:t>
+              <a:t>10/6/22</a:t>
             </a:fld>
             <a:endParaRPr lang="en-US"/>
           </a:p>
@@ -593,7 +593,7 @@
           <a:p>
             <a:fld id="{910FE9F8-85C6-4D94-8C60-6B46B301E45E}" type="datetimeFigureOut">
               <a:rPr lang="en-US" smtClean="0"/>
-              <a:t>9/28/2022</a:t>
+              <a:t>10/6/22</a:t>
             </a:fld>
             <a:endParaRPr lang="en-US"/>
           </a:p>
@@ -763,7 +763,7 @@
           <a:p>
             <a:fld id="{910FE9F8-85C6-4D94-8C60-6B46B301E45E}" type="datetimeFigureOut">
               <a:rPr lang="en-US" smtClean="0"/>
-              <a:t>9/28/2022</a:t>
+              <a:t>10/6/22</a:t>
             </a:fld>
             <a:endParaRPr lang="en-US"/>
           </a:p>
@@ -1009,7 +1009,7 @@
           <a:p>
             <a:fld id="{910FE9F8-85C6-4D94-8C60-6B46B301E45E}" type="datetimeFigureOut">
               <a:rPr lang="en-US" smtClean="0"/>
-              <a:t>9/28/2022</a:t>
+              <a:t>10/6/22</a:t>
             </a:fld>
             <a:endParaRPr lang="en-US"/>
           </a:p>
@@ -1241,7 +1241,7 @@
           <a:p>
             <a:fld id="{910FE9F8-85C6-4D94-8C60-6B46B301E45E}" type="datetimeFigureOut">
               <a:rPr lang="en-US" smtClean="0"/>
-              <a:t>9/28/2022</a:t>
+              <a:t>10/6/22</a:t>
             </a:fld>
             <a:endParaRPr lang="en-US"/>
           </a:p>
@@ -1608,7 +1608,7 @@
           <a:p>
             <a:fld id="{910FE9F8-85C6-4D94-8C60-6B46B301E45E}" type="datetimeFigureOut">
               <a:rPr lang="en-US" smtClean="0"/>
-              <a:t>9/28/2022</a:t>
+              <a:t>10/6/22</a:t>
             </a:fld>
             <a:endParaRPr lang="en-US"/>
           </a:p>
@@ -1726,7 +1726,7 @@
           <a:p>
             <a:fld id="{910FE9F8-85C6-4D94-8C60-6B46B301E45E}" type="datetimeFigureOut">
               <a:rPr lang="en-US" smtClean="0"/>
-              <a:t>9/28/2022</a:t>
+              <a:t>10/6/22</a:t>
             </a:fld>
             <a:endParaRPr lang="en-US"/>
           </a:p>
@@ -1821,7 +1821,7 @@
           <a:p>
             <a:fld id="{910FE9F8-85C6-4D94-8C60-6B46B301E45E}" type="datetimeFigureOut">
               <a:rPr lang="en-US" smtClean="0"/>
-              <a:t>9/28/2022</a:t>
+              <a:t>10/6/22</a:t>
             </a:fld>
             <a:endParaRPr lang="en-US"/>
           </a:p>
@@ -2098,7 +2098,7 @@
           <a:p>
             <a:fld id="{910FE9F8-85C6-4D94-8C60-6B46B301E45E}" type="datetimeFigureOut">
               <a:rPr lang="en-US" smtClean="0"/>
-              <a:t>9/28/2022</a:t>
+              <a:t>10/6/22</a:t>
             </a:fld>
             <a:endParaRPr lang="en-US"/>
           </a:p>
@@ -2355,7 +2355,7 @@
           <a:p>
             <a:fld id="{910FE9F8-85C6-4D94-8C60-6B46B301E45E}" type="datetimeFigureOut">
               <a:rPr lang="en-US" smtClean="0"/>
-              <a:t>9/28/2022</a:t>
+              <a:t>10/6/22</a:t>
             </a:fld>
             <a:endParaRPr lang="en-US"/>
           </a:p>
@@ -2568,7 +2568,7 @@
           <a:p>
             <a:fld id="{910FE9F8-85C6-4D94-8C60-6B46B301E45E}" type="datetimeFigureOut">
               <a:rPr lang="en-US" smtClean="0"/>
-              <a:t>9/28/2022</a:t>
+              <a:t>10/6/22</a:t>
             </a:fld>
             <a:endParaRPr lang="en-US"/>
           </a:p>
@@ -3091,8 +3091,8 @@
         </p:nvSpPr>
         <p:spPr>
           <a:xfrm>
-            <a:off x="3560341" y="386138"/>
-            <a:ext cx="1942513" cy="5443164"/>
+            <a:off x="1902791" y="386138"/>
+            <a:ext cx="3600064" cy="5443164"/>
           </a:xfrm>
           <a:prstGeom prst="rect">
             <a:avLst/>
@@ -3174,7 +3174,7 @@
         </p:blipFill>
         <p:spPr>
           <a:xfrm>
-            <a:off x="3560341" y="386137"/>
+            <a:off x="1900441" y="370399"/>
             <a:ext cx="381000" cy="381000"/>
           </a:xfrm>
           <a:prstGeom prst="rect">
@@ -6714,111 +6714,6 @@
           </a:extLst>
         </p:spPr>
       </p:pic>
-      <p:sp>
-        <p:nvSpPr>
-          <p:cNvPr id="203" name="Rectangle 202">
-            <a:extLst>
-              <a:ext uri="{FF2B5EF4-FFF2-40B4-BE49-F238E27FC236}">
-                <a16:creationId xmlns:a16="http://schemas.microsoft.com/office/drawing/2014/main" id="{F8FC348C-AB2E-47F4-981A-991AF706074A}"/>
-              </a:ext>
-            </a:extLst>
-          </p:cNvPr>
-          <p:cNvSpPr/>
-          <p:nvPr/>
-        </p:nvSpPr>
-        <p:spPr>
-          <a:xfrm>
-            <a:off x="1027571" y="376710"/>
-            <a:ext cx="1942513" cy="5443164"/>
-          </a:xfrm>
-          <a:prstGeom prst="rect">
-            <a:avLst/>
-          </a:prstGeom>
-          <a:noFill/>
-          <a:ln w="12700">
-            <a:solidFill>
-              <a:srgbClr val="5A6B86"/>
-            </a:solidFill>
-          </a:ln>
-        </p:spPr>
-        <p:style>
-          <a:lnRef idx="2">
-            <a:schemeClr val="accent1">
-              <a:shade val="50000"/>
-            </a:schemeClr>
-          </a:lnRef>
-          <a:fillRef idx="1">
-            <a:schemeClr val="accent1"/>
-          </a:fillRef>
-          <a:effectRef idx="0">
-            <a:schemeClr val="accent1"/>
-          </a:effectRef>
-          <a:fontRef idx="minor">
-            <a:schemeClr val="lt1"/>
-          </a:fontRef>
-        </p:style>
-        <p:txBody>
-          <a:bodyPr lIns="502920" tIns="91440"/>
-          <a:lstStyle/>
-          <a:p>
-            <a:pPr eaLnBrk="1" fontAlgn="auto" hangingPunct="1">
-              <a:spcBef>
-                <a:spcPts val="0"/>
-              </a:spcBef>
-              <a:spcAft>
-                <a:spcPts val="0"/>
-              </a:spcAft>
-              <a:defRPr/>
-            </a:pPr>
-            <a:r>
-              <a:rPr lang="en-US" sz="1200" dirty="0">
-                <a:solidFill>
-                  <a:srgbClr val="5A6B86"/>
-                </a:solidFill>
-                <a:latin typeface="Arial" panose="020B0604020202020204" pitchFamily="34" charset="0"/>
-                <a:cs typeface="Arial" panose="020B0604020202020204" pitchFamily="34" charset="0"/>
-              </a:rPr>
-              <a:t>Healthcare provider</a:t>
-            </a:r>
-          </a:p>
-        </p:txBody>
-      </p:sp>
-      <p:pic>
-        <p:nvPicPr>
-          <p:cNvPr id="204" name="Graphic 203">
-            <a:extLst>
-              <a:ext uri="{FF2B5EF4-FFF2-40B4-BE49-F238E27FC236}">
-                <a16:creationId xmlns:a16="http://schemas.microsoft.com/office/drawing/2014/main" id="{3B5B9E69-3463-4FE6-9281-32740B181E1F}"/>
-              </a:ext>
-            </a:extLst>
-          </p:cNvPr>
-          <p:cNvPicPr>
-            <a:picLocks noChangeAspect="1"/>
-          </p:cNvPicPr>
-          <p:nvPr/>
-        </p:nvPicPr>
-        <p:blipFill>
-          <a:blip r:embed="rId4">
-            <a:extLst>
-              <a:ext uri="{96DAC541-7B7A-43D3-8B79-37D633B846F1}">
-                <asvg:svgBlip xmlns:asvg="http://schemas.microsoft.com/office/drawing/2016/SVG/main" r:embed="rId5"/>
-              </a:ext>
-            </a:extLst>
-          </a:blip>
-          <a:stretch>
-            <a:fillRect/>
-          </a:stretch>
-        </p:blipFill>
-        <p:spPr>
-          <a:xfrm>
-            <a:off x="1027571" y="376709"/>
-            <a:ext cx="381000" cy="381000"/>
-          </a:xfrm>
-          <a:prstGeom prst="rect">
-            <a:avLst/>
-          </a:prstGeom>
-        </p:spPr>
-      </p:pic>
       <p:pic>
         <p:nvPicPr>
           <p:cNvPr id="205" name="Graphic 8">
@@ -6846,7 +6741,7 @@
         </p:blipFill>
         <p:spPr bwMode="auto">
           <a:xfrm>
-            <a:off x="1766976" y="1318710"/>
+            <a:off x="2571026" y="1326177"/>
             <a:ext cx="469900" cy="469900"/>
           </a:xfrm>
           <a:prstGeom prst="rect">
@@ -6893,8 +6788,8 @@
         </p:nvSpPr>
         <p:spPr bwMode="auto">
           <a:xfrm>
-            <a:off x="1027570" y="1788609"/>
-            <a:ext cx="1942513" cy="430887"/>
+            <a:off x="1875917" y="1885277"/>
+            <a:ext cx="1942513" cy="600164"/>
           </a:xfrm>
           <a:prstGeom prst="rect">
             <a:avLst/>
@@ -7035,7 +6930,33 @@
                 <a:latin typeface="Arial" panose="020B0604020202020204" pitchFamily="34" charset="0"/>
                 <a:cs typeface="Arial" panose="020B0604020202020204" pitchFamily="34" charset="0"/>
               </a:rPr>
-              <a:t>Virtual appointment application</a:t>
+              <a:t>Self-Service</a:t>
+            </a:r>
+          </a:p>
+          <a:p>
+            <a:pPr algn="ctr" eaLnBrk="1" hangingPunct="1"/>
+            <a:r>
+              <a:rPr lang="en-US" altLang="en-US" sz="1100" dirty="0">
+                <a:solidFill>
+                  <a:srgbClr val="000000"/>
+                </a:solidFill>
+                <a:latin typeface="Arial" panose="020B0604020202020204" pitchFamily="34" charset="0"/>
+                <a:cs typeface="Arial" panose="020B0604020202020204" pitchFamily="34" charset="0"/>
+              </a:rPr>
+              <a:t>Appointment</a:t>
+            </a:r>
+          </a:p>
+          <a:p>
+            <a:pPr algn="ctr" eaLnBrk="1" hangingPunct="1"/>
+            <a:r>
+              <a:rPr lang="en-US" altLang="en-US" sz="1100" dirty="0">
+                <a:solidFill>
+                  <a:srgbClr val="000000"/>
+                </a:solidFill>
+                <a:latin typeface="Arial" panose="020B0604020202020204" pitchFamily="34" charset="0"/>
+                <a:cs typeface="Arial" panose="020B0604020202020204" pitchFamily="34" charset="0"/>
+              </a:rPr>
+              <a:t>Management</a:t>
             </a:r>
           </a:p>
         </p:txBody>
@@ -7057,9 +6978,9 @@
           <p:nvPr/>
         </p:nvCxnSpPr>
         <p:spPr>
-          <a:xfrm>
-            <a:off x="2236876" y="1553660"/>
-            <a:ext cx="1744937" cy="3020"/>
+          <a:xfrm flipV="1">
+            <a:off x="3040926" y="1556680"/>
+            <a:ext cx="940887" cy="4447"/>
           </a:xfrm>
           <a:prstGeom prst="straightConnector1">
             <a:avLst/>
@@ -7327,7 +7248,7 @@
         <p:spPr>
           <a:xfrm>
             <a:off x="732442" y="1553659"/>
-            <a:ext cx="1034534" cy="1"/>
+            <a:ext cx="1838584" cy="7468"/>
           </a:xfrm>
           <a:prstGeom prst="straightConnector1">
             <a:avLst/>

</xml_diff>

<commit_message>
Tighten spacing and tweak SFDC instance box
</commit_message>
<xml_diff>
--- a/docs/deployment_guide/images/architecture-diagram-salesforce-health-cloud-virtual-care.pptx
+++ b/docs/deployment_guide/images/architecture-diagram-salesforce-health-cloud-virtual-care.pptx
@@ -243,7 +243,7 @@
           <a:p>
             <a:fld id="{910FE9F8-85C6-4D94-8C60-6B46B301E45E}" type="datetimeFigureOut">
               <a:rPr lang="en-US" smtClean="0"/>
-              <a:t>10/6/22</a:t>
+              <a:t>2022-10-06</a:t>
             </a:fld>
             <a:endParaRPr lang="en-US"/>
           </a:p>
@@ -413,7 +413,7 @@
           <a:p>
             <a:fld id="{910FE9F8-85C6-4D94-8C60-6B46B301E45E}" type="datetimeFigureOut">
               <a:rPr lang="en-US" smtClean="0"/>
-              <a:t>10/6/22</a:t>
+              <a:t>2022-10-06</a:t>
             </a:fld>
             <a:endParaRPr lang="en-US"/>
           </a:p>
@@ -593,7 +593,7 @@
           <a:p>
             <a:fld id="{910FE9F8-85C6-4D94-8C60-6B46B301E45E}" type="datetimeFigureOut">
               <a:rPr lang="en-US" smtClean="0"/>
-              <a:t>10/6/22</a:t>
+              <a:t>2022-10-06</a:t>
             </a:fld>
             <a:endParaRPr lang="en-US"/>
           </a:p>
@@ -763,7 +763,7 @@
           <a:p>
             <a:fld id="{910FE9F8-85C6-4D94-8C60-6B46B301E45E}" type="datetimeFigureOut">
               <a:rPr lang="en-US" smtClean="0"/>
-              <a:t>10/6/22</a:t>
+              <a:t>2022-10-06</a:t>
             </a:fld>
             <a:endParaRPr lang="en-US"/>
           </a:p>
@@ -1009,7 +1009,7 @@
           <a:p>
             <a:fld id="{910FE9F8-85C6-4D94-8C60-6B46B301E45E}" type="datetimeFigureOut">
               <a:rPr lang="en-US" smtClean="0"/>
-              <a:t>10/6/22</a:t>
+              <a:t>2022-10-06</a:t>
             </a:fld>
             <a:endParaRPr lang="en-US"/>
           </a:p>
@@ -1241,7 +1241,7 @@
           <a:p>
             <a:fld id="{910FE9F8-85C6-4D94-8C60-6B46B301E45E}" type="datetimeFigureOut">
               <a:rPr lang="en-US" smtClean="0"/>
-              <a:t>10/6/22</a:t>
+              <a:t>2022-10-06</a:t>
             </a:fld>
             <a:endParaRPr lang="en-US"/>
           </a:p>
@@ -1608,7 +1608,7 @@
           <a:p>
             <a:fld id="{910FE9F8-85C6-4D94-8C60-6B46B301E45E}" type="datetimeFigureOut">
               <a:rPr lang="en-US" smtClean="0"/>
-              <a:t>10/6/22</a:t>
+              <a:t>2022-10-06</a:t>
             </a:fld>
             <a:endParaRPr lang="en-US"/>
           </a:p>
@@ -1726,7 +1726,7 @@
           <a:p>
             <a:fld id="{910FE9F8-85C6-4D94-8C60-6B46B301E45E}" type="datetimeFigureOut">
               <a:rPr lang="en-US" smtClean="0"/>
-              <a:t>10/6/22</a:t>
+              <a:t>2022-10-06</a:t>
             </a:fld>
             <a:endParaRPr lang="en-US"/>
           </a:p>
@@ -1821,7 +1821,7 @@
           <a:p>
             <a:fld id="{910FE9F8-85C6-4D94-8C60-6B46B301E45E}" type="datetimeFigureOut">
               <a:rPr lang="en-US" smtClean="0"/>
-              <a:t>10/6/22</a:t>
+              <a:t>2022-10-06</a:t>
             </a:fld>
             <a:endParaRPr lang="en-US"/>
           </a:p>
@@ -2098,7 +2098,7 @@
           <a:p>
             <a:fld id="{910FE9F8-85C6-4D94-8C60-6B46B301E45E}" type="datetimeFigureOut">
               <a:rPr lang="en-US" smtClean="0"/>
-              <a:t>10/6/22</a:t>
+              <a:t>2022-10-06</a:t>
             </a:fld>
             <a:endParaRPr lang="en-US"/>
           </a:p>
@@ -2355,7 +2355,7 @@
           <a:p>
             <a:fld id="{910FE9F8-85C6-4D94-8C60-6B46B301E45E}" type="datetimeFigureOut">
               <a:rPr lang="en-US" smtClean="0"/>
-              <a:t>10/6/22</a:t>
+              <a:t>2022-10-06</a:t>
             </a:fld>
             <a:endParaRPr lang="en-US"/>
           </a:p>
@@ -2568,7 +2568,7 @@
           <a:p>
             <a:fld id="{910FE9F8-85C6-4D94-8C60-6B46B301E45E}" type="datetimeFigureOut">
               <a:rPr lang="en-US" smtClean="0"/>
-              <a:t>10/6/22</a:t>
+              <a:t>2022-10-06</a:t>
             </a:fld>
             <a:endParaRPr lang="en-US"/>
           </a:p>
@@ -3091,8 +3091,8 @@
         </p:nvSpPr>
         <p:spPr>
           <a:xfrm>
-            <a:off x="1902791" y="386138"/>
-            <a:ext cx="3600064" cy="5443164"/>
+            <a:off x="2313187" y="386138"/>
+            <a:ext cx="3189668" cy="5443164"/>
           </a:xfrm>
           <a:prstGeom prst="rect">
             <a:avLst/>
@@ -3174,7 +3174,7 @@
         </p:blipFill>
         <p:spPr>
           <a:xfrm>
-            <a:off x="1900441" y="370399"/>
+            <a:off x="2313187" y="390831"/>
             <a:ext cx="381000" cy="381000"/>
           </a:xfrm>
           <a:prstGeom prst="rect">
@@ -7035,7 +7035,7 @@
         </p:blipFill>
         <p:spPr bwMode="auto">
           <a:xfrm>
-            <a:off x="262542" y="1318709"/>
+            <a:off x="1539276" y="1326177"/>
             <a:ext cx="469900" cy="469900"/>
           </a:xfrm>
           <a:prstGeom prst="rect">
@@ -7082,7 +7082,7 @@
         </p:nvSpPr>
         <p:spPr bwMode="auto">
           <a:xfrm>
-            <a:off x="138174" y="1788609"/>
+            <a:off x="1411345" y="1788610"/>
             <a:ext cx="724056" cy="261610"/>
           </a:xfrm>
           <a:prstGeom prst="rect">
@@ -7247,8 +7247,8 @@
         </p:nvCxnSpPr>
         <p:spPr>
           <a:xfrm>
-            <a:off x="732442" y="1553659"/>
-            <a:ext cx="1838584" cy="7468"/>
+            <a:off x="2009176" y="1561127"/>
+            <a:ext cx="561850" cy="0"/>
           </a:xfrm>
           <a:prstGeom prst="straightConnector1">
             <a:avLst/>

</xml_diff>